<commit_message>
(Documentação) - Subindo atualizada a imagem do modelo
</commit_message>
<xml_diff>
--- a/documentacao/banco-de-dados/BancoDeDadosCompassio.pptx
+++ b/documentacao/banco-de-dados/BancoDeDadosCompassio.pptx
@@ -3321,37 +3321,12 @@
           <a:chExt cx="0" cy="0"/>
         </a:xfrm>
       </p:grpSpPr>
-      <p:sp>
-        <p:nvSpPr>
-          <p:cNvPr id="2" name="Title 1">
-            <a:extLst>
-              <a:ext uri="{FF2B5EF4-FFF2-40B4-BE49-F238E27FC236}">
-                <a16:creationId xmlns:a16="http://schemas.microsoft.com/office/drawing/2014/main" id="{A34A36F6-1995-4F30-B284-4448A20A8368}"/>
-              </a:ext>
-            </a:extLst>
-          </p:cNvPr>
-          <p:cNvSpPr>
-            <a:spLocks noGrp="1"/>
-          </p:cNvSpPr>
-          <p:nvPr>
-            <p:ph type="ctrTitle"/>
-          </p:nvPr>
-        </p:nvSpPr>
-        <p:spPr/>
-        <p:txBody>
-          <a:bodyPr/>
-          <a:lstStyle/>
-          <a:p>
-            <a:endParaRPr lang="en-US"/>
-          </a:p>
-        </p:txBody>
-      </p:sp>
       <p:pic>
         <p:nvPicPr>
-          <p:cNvPr id="4" name="Picture 3">
-            <a:extLst>
-              <a:ext uri="{FF2B5EF4-FFF2-40B4-BE49-F238E27FC236}">
-                <a16:creationId xmlns:a16="http://schemas.microsoft.com/office/drawing/2014/main" id="{3031447F-FC45-4CA4-AA00-297FAED3A397}"/>
+          <p:cNvPr id="5" name="Picture 4">
+            <a:extLst>
+              <a:ext uri="{FF2B5EF4-FFF2-40B4-BE49-F238E27FC236}">
+                <a16:creationId xmlns:a16="http://schemas.microsoft.com/office/drawing/2014/main" id="{74492AE6-D51A-43EB-AD93-3309652FA8FA}"/>
               </a:ext>
             </a:extLst>
           </p:cNvPr>
@@ -3368,8 +3343,8 @@
         </p:blipFill>
         <p:spPr>
           <a:xfrm>
-            <a:off x="1409294" y="312150"/>
-            <a:ext cx="9373412" cy="6233700"/>
+            <a:off x="1816999" y="395977"/>
+            <a:ext cx="8558002" cy="6066046"/>
           </a:xfrm>
           <a:prstGeom prst="rect">
             <a:avLst/>

</xml_diff>